<commit_message>
exercises day 1 and 2
</commit_message>
<xml_diff>
--- a/Day1/1a_Introduction/Introduction.pptx
+++ b/Day1/1a_Introduction/Introduction.pptx
@@ -211,7 +211,7 @@
           <a:p>
             <a:fld id="{81459B65-4390-46DC-A909-C5AA3E7AC9F0}" type="datetimeFigureOut">
               <a:rPr lang="en-US" smtClean="0"/>
-              <a:t>3/11/2018</a:t>
+              <a:t>3/12/2018</a:t>
             </a:fld>
             <a:endParaRPr lang="en-US"/>
           </a:p>
@@ -625,7 +625,7 @@
           <a:p>
             <a:fld id="{86547700-D3C9-4C55-BC8F-E116BAECC10F}" type="datetime1">
               <a:rPr lang="en-US" smtClean="0"/>
-              <a:t>3/11/2018</a:t>
+              <a:t>3/12/2018</a:t>
             </a:fld>
             <a:endParaRPr lang="en-US"/>
           </a:p>
@@ -823,7 +823,7 @@
           <a:p>
             <a:fld id="{DA1D32CA-6779-4FC6-92C4-0940039BADF1}" type="datetime1">
               <a:rPr lang="en-US" smtClean="0"/>
-              <a:t>3/11/2018</a:t>
+              <a:t>3/12/2018</a:t>
             </a:fld>
             <a:endParaRPr lang="en-US"/>
           </a:p>
@@ -1031,7 +1031,7 @@
           <a:p>
             <a:fld id="{DB559521-031E-45BD-8702-96BCDBBD24E0}" type="datetime1">
               <a:rPr lang="en-US" smtClean="0"/>
-              <a:t>3/11/2018</a:t>
+              <a:t>3/12/2018</a:t>
             </a:fld>
             <a:endParaRPr lang="en-US"/>
           </a:p>
@@ -1267,7 +1267,7 @@
           <a:p>
             <a:fld id="{8E42898A-6F54-484B-BAD3-DE9B7827CE5F}" type="datetime1">
               <a:rPr lang="en-US" smtClean="0"/>
-              <a:t>3/11/2018</a:t>
+              <a:t>3/12/2018</a:t>
             </a:fld>
             <a:endParaRPr lang="en-US"/>
           </a:p>
@@ -1555,7 +1555,7 @@
           <a:p>
             <a:fld id="{D50F6A7C-2923-4D93-A5F0-B90384B5C072}" type="datetime1">
               <a:rPr lang="en-US" smtClean="0"/>
-              <a:t>3/11/2018</a:t>
+              <a:t>3/12/2018</a:t>
             </a:fld>
             <a:endParaRPr lang="en-US"/>
           </a:p>
@@ -1820,7 +1820,7 @@
           <a:p>
             <a:fld id="{9FE5D702-24D7-4DBC-94BE-A5174157B0AC}" type="datetime1">
               <a:rPr lang="en-US" smtClean="0"/>
-              <a:t>3/11/2018</a:t>
+              <a:t>3/12/2018</a:t>
             </a:fld>
             <a:endParaRPr lang="en-US"/>
           </a:p>
@@ -2232,7 +2232,7 @@
           <a:p>
             <a:fld id="{6260D8B6-3C41-4FF4-BF58-CFF177FE383F}" type="datetime1">
               <a:rPr lang="en-US" smtClean="0"/>
-              <a:t>3/11/2018</a:t>
+              <a:t>3/12/2018</a:t>
             </a:fld>
             <a:endParaRPr lang="en-US"/>
           </a:p>
@@ -2373,7 +2373,7 @@
           <a:p>
             <a:fld id="{0704D4B7-3602-4C67-ADB2-AB9DB103982C}" type="datetime1">
               <a:rPr lang="en-US" smtClean="0"/>
-              <a:t>3/11/2018</a:t>
+              <a:t>3/12/2018</a:t>
             </a:fld>
             <a:endParaRPr lang="en-US"/>
           </a:p>
@@ -2486,7 +2486,7 @@
           <a:p>
             <a:fld id="{23944914-5B74-4E63-890F-EA891B419008}" type="datetime1">
               <a:rPr lang="en-US" smtClean="0"/>
-              <a:t>3/11/2018</a:t>
+              <a:t>3/12/2018</a:t>
             </a:fld>
             <a:endParaRPr lang="en-US"/>
           </a:p>
@@ -2797,7 +2797,7 @@
           <a:p>
             <a:fld id="{DD829AD0-B3EB-46FF-9104-F413E8CD7EA1}" type="datetime1">
               <a:rPr lang="en-US" smtClean="0"/>
-              <a:t>3/11/2018</a:t>
+              <a:t>3/12/2018</a:t>
             </a:fld>
             <a:endParaRPr lang="en-US"/>
           </a:p>
@@ -3085,7 +3085,7 @@
           <a:p>
             <a:fld id="{3BE94D8D-B2DD-4F72-BFDB-EDC58942B9BD}" type="datetime1">
               <a:rPr lang="en-US" smtClean="0"/>
-              <a:t>3/11/2018</a:t>
+              <a:t>3/12/2018</a:t>
             </a:fld>
             <a:endParaRPr lang="en-US"/>
           </a:p>
@@ -3326,7 +3326,7 @@
           <a:p>
             <a:fld id="{AE41816F-9438-4258-9D6F-F7710D03DEE3}" type="datetime1">
               <a:rPr lang="en-US" smtClean="0"/>
-              <a:t>3/11/2018</a:t>
+              <a:t>3/12/2018</a:t>
             </a:fld>
             <a:endParaRPr lang="en-US"/>
           </a:p>
@@ -4206,7 +4206,7 @@
           <a:graphicData uri="http://schemas.openxmlformats.org/presentationml/2006/ole">
             <mc:AlternateContent xmlns:mc="http://schemas.openxmlformats.org/markup-compatibility/2006">
               <mc:Choice xmlns:v="urn:schemas-microsoft-com:vml" Requires="v">
-                <p:oleObj spid="_x0000_s6179" name="Equation" r:id="rId3" imgW="1219200" imgH="419100" progId="Equation.DSMT4">
+                <p:oleObj spid="_x0000_s6181" name="Equation" r:id="rId3" imgW="1219200" imgH="419100" progId="Equation.DSMT4">
                   <p:embed/>
                 </p:oleObj>
               </mc:Choice>
@@ -9993,7 +9993,7 @@
             <p:ph idx="1"/>
             <p:extLst>
               <p:ext uri="{D42A27DB-BD31-4B8C-83A1-F6EECF244321}">
-                <p14:modId xmlns:p14="http://schemas.microsoft.com/office/powerpoint/2010/main" val="3645009658"/>
+                <p14:modId xmlns:p14="http://schemas.microsoft.com/office/powerpoint/2010/main" val="2172111910"/>
               </p:ext>
             </p:extLst>
           </p:nvPr>
@@ -10146,14 +10146,11 @@
                         <a:buChar char="•"/>
                       </a:pPr>
                       <a:r>
-                        <a:rPr lang="en-US" sz="2000">
+                        <a:rPr lang="en-US" sz="2000" dirty="0">
                           <a:latin typeface="Helvetica" panose="020B0504020202030204" pitchFamily="34" charset="0"/>
                         </a:rPr>
-                        <a:t>Estimating uncertainty</a:t>
+                        <a:t>Forecasting</a:t>
                       </a:r>
-                      <a:endParaRPr lang="en-US" sz="2000" dirty="0">
-                        <a:latin typeface="Helvetica" panose="020B0504020202030204" pitchFamily="34" charset="0"/>
-                      </a:endParaRPr>
                     </a:p>
                   </a:txBody>
                   <a:tcPr/>
@@ -10199,17 +10196,20 @@
                         <a:rPr lang="en-US" sz="2000" dirty="0">
                           <a:latin typeface="Helvetica" panose="020B0504020202030204" pitchFamily="34" charset="0"/>
                         </a:rPr>
-                        <a:t>Reading ADMB </a:t>
+                        <a:t>Non-linear models</a:t>
                       </a:r>
+                    </a:p>
+                    <a:p>
+                      <a:pPr marL="285750" indent="-285750">
+                        <a:buFont typeface="Arial" panose="020B0604020202020204" pitchFamily="34" charset="0"/>
+                        <a:buChar char="•"/>
+                      </a:pPr>
                       <a:r>
-                        <a:rPr lang="en-US" sz="2000">
+                        <a:rPr lang="en-US" sz="2000" dirty="0">
                           <a:latin typeface="Helvetica" panose="020B0504020202030204" pitchFamily="34" charset="0"/>
                         </a:rPr>
-                        <a:t>results into R</a:t>
+                        <a:t>Age-structured models</a:t>
                       </a:r>
-                      <a:endParaRPr lang="en-US" sz="2000" dirty="0">
-                        <a:latin typeface="Helvetica" panose="020B0504020202030204" pitchFamily="34" charset="0"/>
-                      </a:endParaRPr>
                     </a:p>
                     <a:p>
                       <a:pPr marL="285750" marR="0" lvl="0" indent="-285750" algn="l" defTabSz="914400" rtl="0" eaLnBrk="1" fontAlgn="auto" latinLnBrk="0" hangingPunct="1">
@@ -10233,31 +10233,32 @@
                         <a:rPr lang="en-US" sz="2000" dirty="0">
                           <a:latin typeface="Helvetica" panose="020B0504020202030204" pitchFamily="34" charset="0"/>
                         </a:rPr>
-                        <a:t>Non-linear models</a:t>
+                        <a:t>ADMB and R</a:t>
                       </a:r>
                     </a:p>
                     <a:p>
-                      <a:pPr marL="285750" indent="-285750">
+                      <a:pPr marL="285750" marR="0" lvl="0" indent="-285750" algn="l" defTabSz="914400" rtl="0" eaLnBrk="1" fontAlgn="auto" latinLnBrk="0" hangingPunct="1">
+                        <a:lnSpc>
+                          <a:spcPct val="100000"/>
+                        </a:lnSpc>
+                        <a:spcBef>
+                          <a:spcPts val="0"/>
+                        </a:spcBef>
+                        <a:spcAft>
+                          <a:spcPts val="0"/>
+                        </a:spcAft>
+                        <a:buClrTx/>
+                        <a:buSzTx/>
                         <a:buFont typeface="Arial" panose="020B0604020202020204" pitchFamily="34" charset="0"/>
                         <a:buChar char="•"/>
+                        <a:tabLst/>
+                        <a:defRPr/>
                       </a:pPr>
                       <a:r>
                         <a:rPr lang="en-US" sz="2000" dirty="0">
                           <a:latin typeface="Helvetica" panose="020B0504020202030204" pitchFamily="34" charset="0"/>
                         </a:rPr>
-                        <a:t>Age-structured models</a:t>
-                      </a:r>
-                    </a:p>
-                    <a:p>
-                      <a:pPr marL="285750" indent="-285750">
-                        <a:buFont typeface="Arial" panose="020B0604020202020204" pitchFamily="34" charset="0"/>
-                        <a:buChar char="•"/>
-                      </a:pPr>
-                      <a:r>
-                        <a:rPr lang="en-US" sz="2000" i="0" dirty="0">
-                          <a:latin typeface="Helvetica" panose="020B0504020202030204" pitchFamily="34" charset="0"/>
-                        </a:rPr>
-                        <a:t>Model diagnostics and selection</a:t>
+                        <a:t>Estimating uncertainty</a:t>
                       </a:r>
                     </a:p>
                   </a:txBody>
@@ -11105,8 +11106,8 @@
           </a:p>
         </p:txBody>
       </p:sp>
-      <mc:AlternateContent xmlns:mc="http://schemas.openxmlformats.org/markup-compatibility/2006">
-        <mc:Choice xmlns:a14="http://schemas.microsoft.com/office/drawing/2010/main" Requires="a14">
+      <mc:AlternateContent xmlns:mc="http://schemas.openxmlformats.org/markup-compatibility/2006" xmlns:a14="http://schemas.microsoft.com/office/drawing/2010/main">
+        <mc:Choice Requires="a14">
           <p:sp>
             <p:nvSpPr>
               <p:cNvPr id="6" name="TextBox 5">
@@ -11172,14 +11173,7 @@
                           <a:latin typeface="Cambria Math" panose="02040503050406030204" pitchFamily="18" charset="0"/>
                           <a:ea typeface="Cambria Math" panose="02040503050406030204" pitchFamily="18" charset="0"/>
                         </a:rPr>
-                        <m:t>𝐷</m:t>
-                      </m:r>
-                      <m:r>
-                        <a:rPr lang="en-US" sz="3600" b="0" i="1" smtClean="0">
-                          <a:latin typeface="Cambria Math" panose="02040503050406030204" pitchFamily="18" charset="0"/>
-                          <a:ea typeface="Cambria Math" panose="02040503050406030204" pitchFamily="18" charset="0"/>
-                        </a:rPr>
-                        <m:t>𝑎𝑡𝑎</m:t>
+                        <m:t>𝐷𝑎𝑡𝑎</m:t>
                       </m:r>
                       <m:r>
                         <a:rPr lang="en-US" sz="3600" b="0" i="1" smtClean="0">
@@ -11196,7 +11190,7 @@
             </p:txBody>
           </p:sp>
         </mc:Choice>
-        <mc:Fallback>
+        <mc:Fallback xmlns="">
           <p:sp>
             <p:nvSpPr>
               <p:cNvPr id="6" name="TextBox 5">
@@ -11482,7 +11476,7 @@
           <a:graphicData uri="http://schemas.openxmlformats.org/presentationml/2006/ole">
             <mc:AlternateContent xmlns:mc="http://schemas.openxmlformats.org/markup-compatibility/2006">
               <mc:Choice xmlns:v="urn:schemas-microsoft-com:vml" Requires="v">
-                <p:oleObj spid="_x0000_s3171" name="Equation" r:id="rId3" imgW="1790700" imgH="228600" progId="Equation.DSMT4">
+                <p:oleObj spid="_x0000_s3173" name="Equation" r:id="rId3" imgW="1790700" imgH="228600" progId="Equation.DSMT4">
                   <p:embed/>
                 </p:oleObj>
               </mc:Choice>

</xml_diff>